<commit_message>
I updated the excel and slides.
</commit_message>
<xml_diff>
--- a/resources/CSCI-331 Group 7 Final Presentation.pptx
+++ b/resources/CSCI-331 Group 7 Final Presentation.pptx
@@ -1336,7 +1336,7 @@
       </p:grpSpPr>
       <p:sp>
         <p:nvSpPr>
-          <p:cNvPr id="227" name="Google Shape;227;g3ac8b76cbae_0_20:notes"/>
+          <p:cNvPr id="227" name="Google Shape;227;g39155f4dc57_0_3:notes"/>
           <p:cNvSpPr/>
           <p:nvPr>
             <p:ph idx="2" type="sldImg"/>
@@ -1371,7 +1371,7 @@
       </p:sp>
       <p:sp>
         <p:nvSpPr>
-          <p:cNvPr id="228" name="Google Shape;228;g3ac8b76cbae_0_20:notes"/>
+          <p:cNvPr id="228" name="Google Shape;228;g39155f4dc57_0_3:notes"/>
           <p:cNvSpPr txBox="1"/>
           <p:nvPr>
             <p:ph idx="1" type="body"/>
@@ -1435,7 +1435,7 @@
       </p:grpSpPr>
       <p:sp>
         <p:nvSpPr>
-          <p:cNvPr id="234" name="Google Shape;234;g3ac8b76cbae_0_25:notes"/>
+          <p:cNvPr id="234" name="Google Shape;234;g39155f4dc57_0_20:notes"/>
           <p:cNvSpPr/>
           <p:nvPr>
             <p:ph idx="2" type="sldImg"/>
@@ -1470,7 +1470,7 @@
       </p:sp>
       <p:sp>
         <p:nvSpPr>
-          <p:cNvPr id="235" name="Google Shape;235;g3ac8b76cbae_0_25:notes"/>
+          <p:cNvPr id="235" name="Google Shape;235;g39155f4dc57_0_20:notes"/>
           <p:cNvSpPr txBox="1"/>
           <p:nvPr>
             <p:ph idx="1" type="body"/>
@@ -1619,7 +1619,7 @@
   <p:cSld>
     <p:spTree>
       <p:nvGrpSpPr>
-        <p:cNvPr id="247" name="Shape 247"/>
+        <p:cNvPr id="248" name="Shape 248"/>
         <p:cNvGrpSpPr/>
         <p:nvPr/>
       </p:nvGrpSpPr>
@@ -1633,7 +1633,7 @@
       </p:grpSpPr>
       <p:sp>
         <p:nvSpPr>
-          <p:cNvPr id="248" name="Google Shape;248;g3acefda34fe_0_0:notes"/>
+          <p:cNvPr id="249" name="Google Shape;249;g3acefda34fe_0_0:notes"/>
           <p:cNvSpPr/>
           <p:nvPr>
             <p:ph idx="2" type="sldImg"/>
@@ -1668,7 +1668,7 @@
       </p:sp>
       <p:sp>
         <p:nvSpPr>
-          <p:cNvPr id="249" name="Google Shape;249;g3acefda34fe_0_0:notes"/>
+          <p:cNvPr id="250" name="Google Shape;250;g3acefda34fe_0_0:notes"/>
           <p:cNvSpPr txBox="1"/>
           <p:nvPr>
             <p:ph idx="1" type="body"/>
@@ -1718,7 +1718,7 @@
   <p:cSld>
     <p:spTree>
       <p:nvGrpSpPr>
-        <p:cNvPr id="253" name="Shape 253"/>
+        <p:cNvPr id="254" name="Shape 254"/>
         <p:cNvGrpSpPr/>
         <p:nvPr/>
       </p:nvGrpSpPr>
@@ -1732,7 +1732,7 @@
       </p:grpSpPr>
       <p:sp>
         <p:nvSpPr>
-          <p:cNvPr id="254" name="Google Shape;254;g3acf9e6fdf2_0_5:notes"/>
+          <p:cNvPr id="255" name="Google Shape;255;g3acf9e6fdf2_0_5:notes"/>
           <p:cNvSpPr/>
           <p:nvPr>
             <p:ph idx="2" type="sldImg"/>
@@ -1767,7 +1767,7 @@
       </p:sp>
       <p:sp>
         <p:nvSpPr>
-          <p:cNvPr id="255" name="Google Shape;255;g3acf9e6fdf2_0_5:notes"/>
+          <p:cNvPr id="256" name="Google Shape;256;g3acf9e6fdf2_0_5:notes"/>
           <p:cNvSpPr txBox="1"/>
           <p:nvPr>
             <p:ph idx="1" type="body"/>
@@ -1916,7 +1916,7 @@
   <p:cSld>
     <p:spTree>
       <p:nvGrpSpPr>
-        <p:cNvPr id="261" name="Shape 261"/>
+        <p:cNvPr id="262" name="Shape 262"/>
         <p:cNvGrpSpPr/>
         <p:nvPr/>
       </p:nvGrpSpPr>
@@ -1930,7 +1930,7 @@
       </p:grpSpPr>
       <p:sp>
         <p:nvSpPr>
-          <p:cNvPr id="262" name="Google Shape;262;g3ac8b76cbae_0_40:notes"/>
+          <p:cNvPr id="263" name="Google Shape;263;g3ac8b76cbae_0_40:notes"/>
           <p:cNvSpPr/>
           <p:nvPr>
             <p:ph idx="2" type="sldImg"/>
@@ -1965,7 +1965,7 @@
       </p:sp>
       <p:sp>
         <p:nvSpPr>
-          <p:cNvPr id="263" name="Google Shape;263;g3ac8b76cbae_0_40:notes"/>
+          <p:cNvPr id="264" name="Google Shape;264;g3ac8b76cbae_0_40:notes"/>
           <p:cNvSpPr txBox="1"/>
           <p:nvPr>
             <p:ph idx="1" type="body"/>
@@ -2015,7 +2015,7 @@
   <p:cSld>
     <p:spTree>
       <p:nvGrpSpPr>
-        <p:cNvPr id="267" name="Shape 267"/>
+        <p:cNvPr id="268" name="Shape 268"/>
         <p:cNvGrpSpPr/>
         <p:nvPr/>
       </p:nvGrpSpPr>
@@ -2029,7 +2029,7 @@
       </p:grpSpPr>
       <p:sp>
         <p:nvSpPr>
-          <p:cNvPr id="268" name="Google Shape;268;g3acd7f599fe_0_0:notes"/>
+          <p:cNvPr id="269" name="Google Shape;269;g3acd7f599fe_0_0:notes"/>
           <p:cNvSpPr/>
           <p:nvPr>
             <p:ph idx="2" type="sldImg"/>
@@ -2064,7 +2064,7 @@
       </p:sp>
       <p:sp>
         <p:nvSpPr>
-          <p:cNvPr id="269" name="Google Shape;269;g3acd7f599fe_0_0:notes"/>
+          <p:cNvPr id="270" name="Google Shape;270;g3acd7f599fe_0_0:notes"/>
           <p:cNvSpPr txBox="1"/>
           <p:nvPr>
             <p:ph idx="1" type="body"/>
@@ -2114,7 +2114,7 @@
   <p:cSld>
     <p:spTree>
       <p:nvGrpSpPr>
-        <p:cNvPr id="273" name="Shape 273"/>
+        <p:cNvPr id="274" name="Shape 274"/>
         <p:cNvGrpSpPr/>
         <p:nvPr/>
       </p:nvGrpSpPr>
@@ -2128,7 +2128,7 @@
       </p:grpSpPr>
       <p:sp>
         <p:nvSpPr>
-          <p:cNvPr id="274" name="Google Shape;274;g3ac7edae1b9_0_0:notes"/>
+          <p:cNvPr id="275" name="Google Shape;275;g3ac7edae1b9_0_0:notes"/>
           <p:cNvSpPr/>
           <p:nvPr>
             <p:ph idx="2" type="sldImg"/>
@@ -2163,7 +2163,7 @@
       </p:sp>
       <p:sp>
         <p:nvSpPr>
-          <p:cNvPr id="275" name="Google Shape;275;g3ac7edae1b9_0_0:notes"/>
+          <p:cNvPr id="276" name="Google Shape;276;g3ac7edae1b9_0_0:notes"/>
           <p:cNvSpPr txBox="1"/>
           <p:nvPr>
             <p:ph idx="1" type="body"/>
@@ -12063,11 +12063,7 @@
             </a:pPr>
             <a:r>
               <a:rPr lang="en" sz="3600"/>
-              <a:t>Results</a:t>
-            </a:r>
-            <a:r>
-              <a:rPr lang="en" sz="3600"/>
-              <a:t> - Expectiminimax</a:t>
+              <a:t>Results - Expectiminimax</a:t>
             </a:r>
             <a:endParaRPr sz="3600"/>
           </a:p>
@@ -12075,7 +12071,7 @@
       </p:sp>
       <p:pic>
         <p:nvPicPr>
-          <p:cNvPr id="231" name="Google Shape;231;p27"/>
+          <p:cNvPr id="231" name="Google Shape;231;p27" title="emm_graph_1.png"/>
           <p:cNvPicPr preferRelativeResize="0"/>
           <p:nvPr/>
         </p:nvPicPr>
@@ -12089,8 +12085,8 @@
         </p:blipFill>
         <p:spPr>
           <a:xfrm>
-            <a:off x="4399274" y="1460250"/>
-            <a:ext cx="4707808" cy="2829700"/>
+            <a:off x="72275" y="1454000"/>
+            <a:ext cx="4425976" cy="2610000"/>
           </a:xfrm>
           <a:prstGeom prst="rect">
             <a:avLst/>
@@ -12103,7 +12099,7 @@
       </p:pic>
       <p:pic>
         <p:nvPicPr>
-          <p:cNvPr id="232" name="Google Shape;232;p27"/>
+          <p:cNvPr id="232" name="Google Shape;232;p27" title="emm_graph_2.png"/>
           <p:cNvPicPr preferRelativeResize="0"/>
           <p:nvPr/>
         </p:nvPicPr>
@@ -12117,8 +12113,8 @@
         </p:blipFill>
         <p:spPr>
           <a:xfrm>
-            <a:off x="31456" y="1460250"/>
-            <a:ext cx="4367825" cy="2829700"/>
+            <a:off x="4595363" y="1454000"/>
+            <a:ext cx="4471511" cy="2610000"/>
           </a:xfrm>
           <a:prstGeom prst="rect">
             <a:avLst/>
@@ -12191,7 +12187,11 @@
             </a:pPr>
             <a:r>
               <a:rPr lang="en" sz="3600"/>
-              <a:t>Results - Monte Carlo</a:t>
+              <a:t>Results - </a:t>
+            </a:r>
+            <a:r>
+              <a:rPr lang="en" sz="3600"/>
+              <a:t> Monte Carlo</a:t>
             </a:r>
             <a:endParaRPr sz="3600"/>
           </a:p>
@@ -12199,7 +12199,7 @@
       </p:sp>
       <p:pic>
         <p:nvPicPr>
-          <p:cNvPr id="238" name="Google Shape;238;p28"/>
+          <p:cNvPr id="238" name="Google Shape;238;p28" title="mcts_graph_1.png"/>
           <p:cNvPicPr preferRelativeResize="0"/>
           <p:nvPr/>
         </p:nvPicPr>
@@ -12213,8 +12213,8 @@
         </p:blipFill>
         <p:spPr>
           <a:xfrm>
-            <a:off x="234525" y="1467682"/>
-            <a:ext cx="4463276" cy="3198043"/>
+            <a:off x="72275" y="1454000"/>
+            <a:ext cx="4499725" cy="2609571"/>
           </a:xfrm>
           <a:prstGeom prst="rect">
             <a:avLst/>
@@ -12227,7 +12227,7 @@
       </p:pic>
       <p:pic>
         <p:nvPicPr>
-          <p:cNvPr id="239" name="Google Shape;239;p28"/>
+          <p:cNvPr id="239" name="Google Shape;239;p28" title="mcts_graph_2.png"/>
           <p:cNvPicPr preferRelativeResize="0"/>
           <p:nvPr/>
         </p:nvPicPr>
@@ -12241,8 +12241,8 @@
         </p:blipFill>
         <p:spPr>
           <a:xfrm>
-            <a:off x="4697786" y="1467675"/>
-            <a:ext cx="4211689" cy="3198050"/>
+            <a:off x="4720575" y="1454000"/>
+            <a:ext cx="4346299" cy="2609575"/>
           </a:xfrm>
           <a:prstGeom prst="rect">
             <a:avLst/>
@@ -12288,8 +12288,8 @@
         </p:nvSpPr>
         <p:spPr>
           <a:xfrm>
-            <a:off x="1297500" y="3033475"/>
-            <a:ext cx="7038900" cy="1895100"/>
+            <a:off x="1297500" y="1307850"/>
+            <a:ext cx="2993400" cy="3522600"/>
           </a:xfrm>
           <a:prstGeom prst="rect">
             <a:avLst/>
@@ -12404,12 +12404,39 @@
       </p:sp>
       <p:pic>
         <p:nvPicPr>
-          <p:cNvPr id="246" name="Google Shape;246;p29"/>
+          <p:cNvPr id="246" name="Google Shape;246;p29" title="emm_data.png"/>
+          <p:cNvPicPr preferRelativeResize="0"/>
+          <p:nvPr/>
+        </p:nvPicPr>
+        <p:blipFill rotWithShape="1">
+          <a:blip r:embed="rId3">
+            <a:alphaModFix/>
+          </a:blip>
+          <a:srcRect b="0" l="0" r="0" t="2572"/>
+          <a:stretch/>
+        </p:blipFill>
+        <p:spPr>
+          <a:xfrm>
+            <a:off x="4402575" y="1307850"/>
+            <a:ext cx="4037617" cy="1419225"/>
+          </a:xfrm>
+          <a:prstGeom prst="rect">
+            <a:avLst/>
+          </a:prstGeom>
+          <a:noFill/>
+          <a:ln>
+            <a:noFill/>
+          </a:ln>
+        </p:spPr>
+      </p:pic>
+      <p:pic>
+        <p:nvPicPr>
+          <p:cNvPr id="247" name="Google Shape;247;p29" title="mcts_data.png"/>
           <p:cNvPicPr preferRelativeResize="0"/>
           <p:nvPr/>
         </p:nvPicPr>
         <p:blipFill>
-          <a:blip r:embed="rId3">
+          <a:blip r:embed="rId4">
             <a:alphaModFix/>
           </a:blip>
           <a:stretch>
@@ -12418,8 +12445,8 @@
         </p:blipFill>
         <p:spPr>
           <a:xfrm>
-            <a:off x="1297501" y="1307850"/>
-            <a:ext cx="7038901" cy="1725637"/>
+            <a:off x="4402575" y="3020700"/>
+            <a:ext cx="4324350" cy="1809750"/>
           </a:xfrm>
           <a:prstGeom prst="rect">
             <a:avLst/>
@@ -12443,7 +12470,7 @@
   <p:cSld>
     <p:spTree>
       <p:nvGrpSpPr>
-        <p:cNvPr id="250" name="Shape 250"/>
+        <p:cNvPr id="251" name="Shape 251"/>
         <p:cNvGrpSpPr/>
         <p:nvPr/>
       </p:nvGrpSpPr>
@@ -12457,7 +12484,7 @@
       </p:grpSpPr>
       <p:sp>
         <p:nvSpPr>
-          <p:cNvPr id="251" name="Google Shape;251;p30"/>
+          <p:cNvPr id="252" name="Google Shape;252;p30"/>
           <p:cNvSpPr txBox="1"/>
           <p:nvPr>
             <p:ph type="title"/>
@@ -12500,7 +12527,7 @@
       </p:sp>
       <p:sp>
         <p:nvSpPr>
-          <p:cNvPr id="252" name="Google Shape;252;p30"/>
+          <p:cNvPr id="253" name="Google Shape;253;p30"/>
           <p:cNvSpPr txBox="1"/>
           <p:nvPr>
             <p:ph idx="1" type="body"/>
@@ -12788,7 +12815,7 @@
   <p:cSld>
     <p:spTree>
       <p:nvGrpSpPr>
-        <p:cNvPr id="256" name="Shape 256"/>
+        <p:cNvPr id="257" name="Shape 257"/>
         <p:cNvGrpSpPr/>
         <p:nvPr/>
       </p:nvGrpSpPr>
@@ -12802,7 +12829,7 @@
       </p:grpSpPr>
       <p:sp>
         <p:nvSpPr>
-          <p:cNvPr id="257" name="Google Shape;257;p31"/>
+          <p:cNvPr id="258" name="Google Shape;258;p31"/>
           <p:cNvSpPr txBox="1"/>
           <p:nvPr>
             <p:ph type="title"/>
@@ -12846,7 +12873,7 @@
       </p:sp>
       <p:sp>
         <p:nvSpPr>
-          <p:cNvPr id="258" name="Google Shape;258;p31"/>
+          <p:cNvPr id="259" name="Google Shape;259;p31"/>
           <p:cNvSpPr txBox="1"/>
           <p:nvPr>
             <p:ph idx="1" type="body"/>
@@ -12927,7 +12954,7 @@
       </p:sp>
       <p:pic>
         <p:nvPicPr>
-          <p:cNvPr id="259" name="Google Shape;259;p31" title="2048_snake_double.png"/>
+          <p:cNvPr id="260" name="Google Shape;260;p31" title="2048_snake_double.png"/>
           <p:cNvPicPr preferRelativeResize="0"/>
           <p:nvPr/>
         </p:nvPicPr>
@@ -12955,7 +12982,7 @@
       </p:pic>
       <p:pic>
         <p:nvPicPr>
-          <p:cNvPr id="260" name="Google Shape;260;p31" title="board_bonus_heuristic.jpg"/>
+          <p:cNvPr id="261" name="Google Shape;261;p31" title="board_bonus_heuristic.jpg"/>
           <p:cNvPicPr preferRelativeResize="0"/>
           <p:nvPr/>
         </p:nvPicPr>
@@ -13254,7 +13281,7 @@
   <p:cSld>
     <p:spTree>
       <p:nvGrpSpPr>
-        <p:cNvPr id="264" name="Shape 264"/>
+        <p:cNvPr id="265" name="Shape 265"/>
         <p:cNvGrpSpPr/>
         <p:nvPr/>
       </p:nvGrpSpPr>
@@ -13268,7 +13295,7 @@
       </p:grpSpPr>
       <p:sp>
         <p:nvSpPr>
-          <p:cNvPr id="265" name="Google Shape;265;p32"/>
+          <p:cNvPr id="266" name="Google Shape;266;p32"/>
           <p:cNvSpPr txBox="1"/>
           <p:nvPr>
             <p:ph type="title"/>
@@ -13323,7 +13350,7 @@
       </p:sp>
       <p:sp>
         <p:nvSpPr>
-          <p:cNvPr id="266" name="Google Shape;266;p32"/>
+          <p:cNvPr id="267" name="Google Shape;267;p32"/>
           <p:cNvSpPr txBox="1"/>
           <p:nvPr>
             <p:ph idx="1" type="body"/>
@@ -13424,7 +13451,7 @@
             </a:pPr>
             <a:r>
               <a:rPr lang="en" sz="1600" u="sng"/>
-              <a:t>Expectiminmax</a:t>
+              <a:t>Expectiminimax</a:t>
             </a:r>
             <a:r>
               <a:rPr lang="en" sz="1600"/>
@@ -13547,7 +13574,7 @@
   <p:cSld>
     <p:spTree>
       <p:nvGrpSpPr>
-        <p:cNvPr id="270" name="Shape 270"/>
+        <p:cNvPr id="271" name="Shape 271"/>
         <p:cNvGrpSpPr/>
         <p:nvPr/>
       </p:nvGrpSpPr>
@@ -13561,7 +13588,7 @@
       </p:grpSpPr>
       <p:sp>
         <p:nvSpPr>
-          <p:cNvPr id="271" name="Google Shape;271;p33"/>
+          <p:cNvPr id="272" name="Google Shape;272;p33"/>
           <p:cNvSpPr txBox="1"/>
           <p:nvPr>
             <p:ph type="title"/>
@@ -13604,7 +13631,7 @@
       </p:sp>
       <p:sp>
         <p:nvSpPr>
-          <p:cNvPr id="272" name="Google Shape;272;p33"/>
+          <p:cNvPr id="273" name="Google Shape;273;p33"/>
           <p:cNvSpPr txBox="1"/>
           <p:nvPr>
             <p:ph idx="1" type="body"/>
@@ -13862,7 +13889,7 @@
   <p:cSld>
     <p:spTree>
       <p:nvGrpSpPr>
-        <p:cNvPr id="276" name="Shape 276"/>
+        <p:cNvPr id="277" name="Shape 277"/>
         <p:cNvGrpSpPr/>
         <p:nvPr/>
       </p:nvGrpSpPr>
@@ -13876,7 +13903,7 @@
       </p:grpSpPr>
       <p:sp>
         <p:nvSpPr>
-          <p:cNvPr id="277" name="Google Shape;277;p34"/>
+          <p:cNvPr id="278" name="Google Shape;278;p34"/>
           <p:cNvSpPr txBox="1"/>
           <p:nvPr>
             <p:ph type="title"/>
@@ -15463,6 +15490,285 @@
 </file>
 
 <file path=ppt/theme/theme1.xml><?xml version="1.0" encoding="utf-8"?>
+<a:theme xmlns:a="http://schemas.openxmlformats.org/drawingml/2006/main" xmlns:r="http://schemas.openxmlformats.org/officeDocument/2006/relationships" name="Focus">
+  <a:themeElements>
+    <a:clrScheme name="Focus">
+      <a:dk1>
+        <a:srgbClr val="1B212C"/>
+      </a:dk1>
+      <a:lt1>
+        <a:srgbClr val="FFFFFF"/>
+      </a:lt1>
+      <a:dk2>
+        <a:srgbClr val="D9D9D9"/>
+      </a:dk2>
+      <a:lt2>
+        <a:srgbClr val="82C7A5"/>
+      </a:lt2>
+      <a:accent1>
+        <a:srgbClr val="0145AC"/>
+      </a:accent1>
+      <a:accent2>
+        <a:srgbClr val="EECE1A"/>
+      </a:accent2>
+      <a:accent3>
+        <a:srgbClr val="4E5567"/>
+      </a:accent3>
+      <a:accent4>
+        <a:srgbClr val="F4D6AD"/>
+      </a:accent4>
+      <a:accent5>
+        <a:srgbClr val="7890CD"/>
+      </a:accent5>
+      <a:accent6>
+        <a:srgbClr val="F15E22"/>
+      </a:accent6>
+      <a:hlink>
+        <a:srgbClr val="7890CD"/>
+      </a:hlink>
+      <a:folHlink>
+        <a:srgbClr val="7890CD"/>
+      </a:folHlink>
+    </a:clrScheme>
+    <a:fontScheme name="Office">
+      <a:majorFont>
+        <a:latin typeface="Arial"/>
+        <a:ea typeface=""/>
+        <a:cs typeface=""/>
+        <a:font script="Jpan" typeface="ＭＳ Ｐゴシック"/>
+        <a:font script="Hang" typeface="맑은 고딕"/>
+        <a:font script="Hans" typeface="宋体"/>
+        <a:font script="Hant" typeface="新細明體"/>
+        <a:font script="Arab" typeface="Times New Roman"/>
+        <a:font script="Hebr" typeface="Times New Roman"/>
+        <a:font script="Thai" typeface="Angsana New"/>
+        <a:font script="Ethi" typeface="Nyala"/>
+        <a:font script="Beng" typeface="Vrinda"/>
+        <a:font script="Gujr" typeface="Shruti"/>
+        <a:font script="Khmr" typeface="MoolBoran"/>
+        <a:font script="Knda" typeface="Tunga"/>
+        <a:font script="Guru" typeface="Raavi"/>
+        <a:font script="Cans" typeface="Euphemia"/>
+        <a:font script="Cher" typeface="Plantagenet Cherokee"/>
+        <a:font script="Yiii" typeface="Microsoft Yi Baiti"/>
+        <a:font script="Tibt" typeface="Microsoft Himalaya"/>
+        <a:font script="Thaa" typeface="MV Boli"/>
+        <a:font script="Deva" typeface="Mangal"/>
+        <a:font script="Telu" typeface="Gautami"/>
+        <a:font script="Taml" typeface="Latha"/>
+        <a:font script="Syrc" typeface="Estrangelo Edessa"/>
+        <a:font script="Orya" typeface="Kalinga"/>
+        <a:font script="Mlym" typeface="Kartika"/>
+        <a:font script="Laoo" typeface="DokChampa"/>
+        <a:font script="Sinh" typeface="Iskoola Pota"/>
+        <a:font script="Mong" typeface="Mongolian Baiti"/>
+        <a:font script="Viet" typeface="Times New Roman"/>
+        <a:font script="Uigh" typeface="Microsoft Uighur"/>
+        <a:font script="Geor" typeface="Sylfaen"/>
+      </a:majorFont>
+      <a:minorFont>
+        <a:latin typeface="Arial"/>
+        <a:ea typeface=""/>
+        <a:cs typeface=""/>
+        <a:font script="Jpan" typeface="ＭＳ Ｐゴシック"/>
+        <a:font script="Hang" typeface="맑은 고딕"/>
+        <a:font script="Hans" typeface="宋体"/>
+        <a:font script="Hant" typeface="新細明體"/>
+        <a:font script="Arab" typeface="Arial"/>
+        <a:font script="Hebr" typeface="Arial"/>
+        <a:font script="Thai" typeface="Cordia New"/>
+        <a:font script="Ethi" typeface="Nyala"/>
+        <a:font script="Beng" typeface="Vrinda"/>
+        <a:font script="Gujr" typeface="Shruti"/>
+        <a:font script="Khmr" typeface="DaunPenh"/>
+        <a:font script="Knda" typeface="Tunga"/>
+        <a:font script="Guru" typeface="Raavi"/>
+        <a:font script="Cans" typeface="Euphemia"/>
+        <a:font script="Cher" typeface="Plantagenet Cherokee"/>
+        <a:font script="Yiii" typeface="Microsoft Yi Baiti"/>
+        <a:font script="Tibt" typeface="Microsoft Himalaya"/>
+        <a:font script="Thaa" typeface="MV Boli"/>
+        <a:font script="Deva" typeface="Mangal"/>
+        <a:font script="Telu" typeface="Gautami"/>
+        <a:font script="Taml" typeface="Latha"/>
+        <a:font script="Syrc" typeface="Estrangelo Edessa"/>
+        <a:font script="Orya" typeface="Kalinga"/>
+        <a:font script="Mlym" typeface="Kartika"/>
+        <a:font script="Laoo" typeface="DokChampa"/>
+        <a:font script="Sinh" typeface="Iskoola Pota"/>
+        <a:font script="Mong" typeface="Mongolian Baiti"/>
+        <a:font script="Viet" typeface="Arial"/>
+        <a:font script="Uigh" typeface="Microsoft Uighur"/>
+        <a:font script="Geor" typeface="Sylfaen"/>
+      </a:minorFont>
+    </a:fontScheme>
+    <a:fmtScheme name="Office">
+      <a:fillStyleLst>
+        <a:solidFill>
+          <a:schemeClr val="phClr"/>
+        </a:solidFill>
+        <a:gradFill rotWithShape="1">
+          <a:gsLst>
+            <a:gs pos="0">
+              <a:schemeClr val="phClr">
+                <a:tint val="50000"/>
+                <a:satMod val="300000"/>
+              </a:schemeClr>
+            </a:gs>
+            <a:gs pos="35000">
+              <a:schemeClr val="phClr">
+                <a:tint val="37000"/>
+                <a:satMod val="300000"/>
+              </a:schemeClr>
+            </a:gs>
+            <a:gs pos="100000">
+              <a:schemeClr val="phClr">
+                <a:tint val="15000"/>
+                <a:satMod val="350000"/>
+              </a:schemeClr>
+            </a:gs>
+          </a:gsLst>
+          <a:lin ang="16200000" scaled="1"/>
+        </a:gradFill>
+        <a:gradFill rotWithShape="1">
+          <a:gsLst>
+            <a:gs pos="0">
+              <a:schemeClr val="phClr">
+                <a:tint val="100000"/>
+                <a:shade val="100000"/>
+                <a:satMod val="130000"/>
+              </a:schemeClr>
+            </a:gs>
+            <a:gs pos="100000">
+              <a:schemeClr val="phClr">
+                <a:tint val="50000"/>
+                <a:shade val="100000"/>
+                <a:satMod val="350000"/>
+              </a:schemeClr>
+            </a:gs>
+          </a:gsLst>
+          <a:lin ang="16200000" scaled="0"/>
+        </a:gradFill>
+      </a:fillStyleLst>
+      <a:lnStyleLst>
+        <a:ln w="9525" cap="flat" cmpd="sng" algn="ctr">
+          <a:solidFill>
+            <a:schemeClr val="phClr">
+              <a:shade val="95000"/>
+              <a:satMod val="105000"/>
+            </a:schemeClr>
+          </a:solidFill>
+          <a:prstDash val="solid"/>
+        </a:ln>
+        <a:ln w="25400" cap="flat" cmpd="sng" algn="ctr">
+          <a:solidFill>
+            <a:schemeClr val="phClr"/>
+          </a:solidFill>
+          <a:prstDash val="solid"/>
+        </a:ln>
+        <a:ln w="38100" cap="flat" cmpd="sng" algn="ctr">
+          <a:solidFill>
+            <a:schemeClr val="phClr"/>
+          </a:solidFill>
+          <a:prstDash val="solid"/>
+        </a:ln>
+      </a:lnStyleLst>
+      <a:effectStyleLst>
+        <a:effectStyle>
+          <a:effectLst>
+            <a:outerShdw blurRad="40000" dist="20000" dir="5400000" rotWithShape="0">
+              <a:srgbClr val="000000">
+                <a:alpha val="38000"/>
+              </a:srgbClr>
+            </a:outerShdw>
+          </a:effectLst>
+        </a:effectStyle>
+        <a:effectStyle>
+          <a:effectLst>
+            <a:outerShdw blurRad="40000" dist="23000" dir="5400000" rotWithShape="0">
+              <a:srgbClr val="000000">
+                <a:alpha val="35000"/>
+              </a:srgbClr>
+            </a:outerShdw>
+          </a:effectLst>
+        </a:effectStyle>
+        <a:effectStyle>
+          <a:effectLst>
+            <a:outerShdw blurRad="40000" dist="23000" dir="5400000" rotWithShape="0">
+              <a:srgbClr val="000000">
+                <a:alpha val="35000"/>
+              </a:srgbClr>
+            </a:outerShdw>
+          </a:effectLst>
+          <a:scene3d>
+            <a:camera prst="orthographicFront">
+              <a:rot lat="0" lon="0" rev="0"/>
+            </a:camera>
+            <a:lightRig rig="threePt" dir="t">
+              <a:rot lat="0" lon="0" rev="1200000"/>
+            </a:lightRig>
+          </a:scene3d>
+          <a:sp3d>
+            <a:bevelT w="63500" h="25400"/>
+          </a:sp3d>
+        </a:effectStyle>
+      </a:effectStyleLst>
+      <a:bgFillStyleLst>
+        <a:solidFill>
+          <a:schemeClr val="phClr"/>
+        </a:solidFill>
+        <a:gradFill rotWithShape="1">
+          <a:gsLst>
+            <a:gs pos="0">
+              <a:schemeClr val="phClr">
+                <a:tint val="40000"/>
+                <a:satMod val="350000"/>
+              </a:schemeClr>
+            </a:gs>
+            <a:gs pos="40000">
+              <a:schemeClr val="phClr">
+                <a:tint val="45000"/>
+                <a:shade val="99000"/>
+                <a:satMod val="350000"/>
+              </a:schemeClr>
+            </a:gs>
+            <a:gs pos="100000">
+              <a:schemeClr val="phClr">
+                <a:shade val="20000"/>
+                <a:satMod val="255000"/>
+              </a:schemeClr>
+            </a:gs>
+          </a:gsLst>
+          <a:path path="circle">
+            <a:fillToRect l="50000" t="-80000" r="50000" b="180000"/>
+          </a:path>
+        </a:gradFill>
+        <a:gradFill rotWithShape="1">
+          <a:gsLst>
+            <a:gs pos="0">
+              <a:schemeClr val="phClr">
+                <a:tint val="80000"/>
+                <a:satMod val="300000"/>
+              </a:schemeClr>
+            </a:gs>
+            <a:gs pos="100000">
+              <a:schemeClr val="phClr">
+                <a:shade val="30000"/>
+                <a:satMod val="200000"/>
+              </a:schemeClr>
+            </a:gs>
+          </a:gsLst>
+          <a:path path="circle">
+            <a:fillToRect l="50000" t="50000" r="50000" b="50000"/>
+          </a:path>
+        </a:gradFill>
+      </a:bgFillStyleLst>
+    </a:fmtScheme>
+  </a:themeElements>
+</a:theme>
+</file>
+
+<file path=ppt/theme/theme2.xml><?xml version="1.0" encoding="utf-8"?>
 <a:theme xmlns:a="http://schemas.openxmlformats.org/drawingml/2006/main" xmlns:r="http://schemas.openxmlformats.org/officeDocument/2006/relationships">
   <a:themeElements>
     <a:clrScheme name="Default">
@@ -15739,283 +16045,4 @@
     </a:fmtScheme>
   </a:themeElements>
 </a:theme>
-</file>
-
-<file path=ppt/theme/theme2.xml><?xml version="1.0" encoding="utf-8"?>
-<a:theme xmlns:a="http://schemas.openxmlformats.org/drawingml/2006/main" xmlns:r="http://schemas.openxmlformats.org/officeDocument/2006/relationships" name="Focus">
-  <a:themeElements>
-    <a:clrScheme name="Focus">
-      <a:dk1>
-        <a:srgbClr val="1B212C"/>
-      </a:dk1>
-      <a:lt1>
-        <a:srgbClr val="FFFFFF"/>
-      </a:lt1>
-      <a:dk2>
-        <a:srgbClr val="D9D9D9"/>
-      </a:dk2>
-      <a:lt2>
-        <a:srgbClr val="82C7A5"/>
-      </a:lt2>
-      <a:accent1>
-        <a:srgbClr val="0145AC"/>
-      </a:accent1>
-      <a:accent2>
-        <a:srgbClr val="EECE1A"/>
-      </a:accent2>
-      <a:accent3>
-        <a:srgbClr val="4E5567"/>
-      </a:accent3>
-      <a:accent4>
-        <a:srgbClr val="F4D6AD"/>
-      </a:accent4>
-      <a:accent5>
-        <a:srgbClr val="7890CD"/>
-      </a:accent5>
-      <a:accent6>
-        <a:srgbClr val="F15E22"/>
-      </a:accent6>
-      <a:hlink>
-        <a:srgbClr val="7890CD"/>
-      </a:hlink>
-      <a:folHlink>
-        <a:srgbClr val="7890CD"/>
-      </a:folHlink>
-    </a:clrScheme>
-    <a:fontScheme name="Office">
-      <a:majorFont>
-        <a:latin typeface="Arial"/>
-        <a:ea typeface=""/>
-        <a:cs typeface=""/>
-        <a:font script="Jpan" typeface="ＭＳ Ｐゴシック"/>
-        <a:font script="Hang" typeface="맑은 고딕"/>
-        <a:font script="Hans" typeface="宋体"/>
-        <a:font script="Hant" typeface="新細明體"/>
-        <a:font script="Arab" typeface="Times New Roman"/>
-        <a:font script="Hebr" typeface="Times New Roman"/>
-        <a:font script="Thai" typeface="Angsana New"/>
-        <a:font script="Ethi" typeface="Nyala"/>
-        <a:font script="Beng" typeface="Vrinda"/>
-        <a:font script="Gujr" typeface="Shruti"/>
-        <a:font script="Khmr" typeface="MoolBoran"/>
-        <a:font script="Knda" typeface="Tunga"/>
-        <a:font script="Guru" typeface="Raavi"/>
-        <a:font script="Cans" typeface="Euphemia"/>
-        <a:font script="Cher" typeface="Plantagenet Cherokee"/>
-        <a:font script="Yiii" typeface="Microsoft Yi Baiti"/>
-        <a:font script="Tibt" typeface="Microsoft Himalaya"/>
-        <a:font script="Thaa" typeface="MV Boli"/>
-        <a:font script="Deva" typeface="Mangal"/>
-        <a:font script="Telu" typeface="Gautami"/>
-        <a:font script="Taml" typeface="Latha"/>
-        <a:font script="Syrc" typeface="Estrangelo Edessa"/>
-        <a:font script="Orya" typeface="Kalinga"/>
-        <a:font script="Mlym" typeface="Kartika"/>
-        <a:font script="Laoo" typeface="DokChampa"/>
-        <a:font script="Sinh" typeface="Iskoola Pota"/>
-        <a:font script="Mong" typeface="Mongolian Baiti"/>
-        <a:font script="Viet" typeface="Times New Roman"/>
-        <a:font script="Uigh" typeface="Microsoft Uighur"/>
-        <a:font script="Geor" typeface="Sylfaen"/>
-      </a:majorFont>
-      <a:minorFont>
-        <a:latin typeface="Arial"/>
-        <a:ea typeface=""/>
-        <a:cs typeface=""/>
-        <a:font script="Jpan" typeface="ＭＳ Ｐゴシック"/>
-        <a:font script="Hang" typeface="맑은 고딕"/>
-        <a:font script="Hans" typeface="宋体"/>
-        <a:font script="Hant" typeface="新細明體"/>
-        <a:font script="Arab" typeface="Arial"/>
-        <a:font script="Hebr" typeface="Arial"/>
-        <a:font script="Thai" typeface="Cordia New"/>
-        <a:font script="Ethi" typeface="Nyala"/>
-        <a:font script="Beng" typeface="Vrinda"/>
-        <a:font script="Gujr" typeface="Shruti"/>
-        <a:font script="Khmr" typeface="DaunPenh"/>
-        <a:font script="Knda" typeface="Tunga"/>
-        <a:font script="Guru" typeface="Raavi"/>
-        <a:font script="Cans" typeface="Euphemia"/>
-        <a:font script="Cher" typeface="Plantagenet Cherokee"/>
-        <a:font script="Yiii" typeface="Microsoft Yi Baiti"/>
-        <a:font script="Tibt" typeface="Microsoft Himalaya"/>
-        <a:font script="Thaa" typeface="MV Boli"/>
-        <a:font script="Deva" typeface="Mangal"/>
-        <a:font script="Telu" typeface="Gautami"/>
-        <a:font script="Taml" typeface="Latha"/>
-        <a:font script="Syrc" typeface="Estrangelo Edessa"/>
-        <a:font script="Orya" typeface="Kalinga"/>
-        <a:font script="Mlym" typeface="Kartika"/>
-        <a:font script="Laoo" typeface="DokChampa"/>
-        <a:font script="Sinh" typeface="Iskoola Pota"/>
-        <a:font script="Mong" typeface="Mongolian Baiti"/>
-        <a:font script="Viet" typeface="Arial"/>
-        <a:font script="Uigh" typeface="Microsoft Uighur"/>
-        <a:font script="Geor" typeface="Sylfaen"/>
-      </a:minorFont>
-    </a:fontScheme>
-    <a:fmtScheme name="Office">
-      <a:fillStyleLst>
-        <a:solidFill>
-          <a:schemeClr val="phClr"/>
-        </a:solidFill>
-        <a:gradFill rotWithShape="1">
-          <a:gsLst>
-            <a:gs pos="0">
-              <a:schemeClr val="phClr">
-                <a:tint val="50000"/>
-                <a:satMod val="300000"/>
-              </a:schemeClr>
-            </a:gs>
-            <a:gs pos="35000">
-              <a:schemeClr val="phClr">
-                <a:tint val="37000"/>
-                <a:satMod val="300000"/>
-              </a:schemeClr>
-            </a:gs>
-            <a:gs pos="100000">
-              <a:schemeClr val="phClr">
-                <a:tint val="15000"/>
-                <a:satMod val="350000"/>
-              </a:schemeClr>
-            </a:gs>
-          </a:gsLst>
-          <a:lin ang="16200000" scaled="1"/>
-        </a:gradFill>
-        <a:gradFill rotWithShape="1">
-          <a:gsLst>
-            <a:gs pos="0">
-              <a:schemeClr val="phClr">
-                <a:tint val="100000"/>
-                <a:shade val="100000"/>
-                <a:satMod val="130000"/>
-              </a:schemeClr>
-            </a:gs>
-            <a:gs pos="100000">
-              <a:schemeClr val="phClr">
-                <a:tint val="50000"/>
-                <a:shade val="100000"/>
-                <a:satMod val="350000"/>
-              </a:schemeClr>
-            </a:gs>
-          </a:gsLst>
-          <a:lin ang="16200000" scaled="0"/>
-        </a:gradFill>
-      </a:fillStyleLst>
-      <a:lnStyleLst>
-        <a:ln w="9525" cap="flat" cmpd="sng" algn="ctr">
-          <a:solidFill>
-            <a:schemeClr val="phClr">
-              <a:shade val="95000"/>
-              <a:satMod val="105000"/>
-            </a:schemeClr>
-          </a:solidFill>
-          <a:prstDash val="solid"/>
-        </a:ln>
-        <a:ln w="25400" cap="flat" cmpd="sng" algn="ctr">
-          <a:solidFill>
-            <a:schemeClr val="phClr"/>
-          </a:solidFill>
-          <a:prstDash val="solid"/>
-        </a:ln>
-        <a:ln w="38100" cap="flat" cmpd="sng" algn="ctr">
-          <a:solidFill>
-            <a:schemeClr val="phClr"/>
-          </a:solidFill>
-          <a:prstDash val="solid"/>
-        </a:ln>
-      </a:lnStyleLst>
-      <a:effectStyleLst>
-        <a:effectStyle>
-          <a:effectLst>
-            <a:outerShdw blurRad="40000" dist="20000" dir="5400000" rotWithShape="0">
-              <a:srgbClr val="000000">
-                <a:alpha val="38000"/>
-              </a:srgbClr>
-            </a:outerShdw>
-          </a:effectLst>
-        </a:effectStyle>
-        <a:effectStyle>
-          <a:effectLst>
-            <a:outerShdw blurRad="40000" dist="23000" dir="5400000" rotWithShape="0">
-              <a:srgbClr val="000000">
-                <a:alpha val="35000"/>
-              </a:srgbClr>
-            </a:outerShdw>
-          </a:effectLst>
-        </a:effectStyle>
-        <a:effectStyle>
-          <a:effectLst>
-            <a:outerShdw blurRad="40000" dist="23000" dir="5400000" rotWithShape="0">
-              <a:srgbClr val="000000">
-                <a:alpha val="35000"/>
-              </a:srgbClr>
-            </a:outerShdw>
-          </a:effectLst>
-          <a:scene3d>
-            <a:camera prst="orthographicFront">
-              <a:rot lat="0" lon="0" rev="0"/>
-            </a:camera>
-            <a:lightRig rig="threePt" dir="t">
-              <a:rot lat="0" lon="0" rev="1200000"/>
-            </a:lightRig>
-          </a:scene3d>
-          <a:sp3d>
-            <a:bevelT w="63500" h="25400"/>
-          </a:sp3d>
-        </a:effectStyle>
-      </a:effectStyleLst>
-      <a:bgFillStyleLst>
-        <a:solidFill>
-          <a:schemeClr val="phClr"/>
-        </a:solidFill>
-        <a:gradFill rotWithShape="1">
-          <a:gsLst>
-            <a:gs pos="0">
-              <a:schemeClr val="phClr">
-                <a:tint val="40000"/>
-                <a:satMod val="350000"/>
-              </a:schemeClr>
-            </a:gs>
-            <a:gs pos="40000">
-              <a:schemeClr val="phClr">
-                <a:tint val="45000"/>
-                <a:shade val="99000"/>
-                <a:satMod val="350000"/>
-              </a:schemeClr>
-            </a:gs>
-            <a:gs pos="100000">
-              <a:schemeClr val="phClr">
-                <a:shade val="20000"/>
-                <a:satMod val="255000"/>
-              </a:schemeClr>
-            </a:gs>
-          </a:gsLst>
-          <a:path path="circle">
-            <a:fillToRect l="50000" t="-80000" r="50000" b="180000"/>
-          </a:path>
-        </a:gradFill>
-        <a:gradFill rotWithShape="1">
-          <a:gsLst>
-            <a:gs pos="0">
-              <a:schemeClr val="phClr">
-                <a:tint val="80000"/>
-                <a:satMod val="300000"/>
-              </a:schemeClr>
-            </a:gs>
-            <a:gs pos="100000">
-              <a:schemeClr val="phClr">
-                <a:shade val="30000"/>
-                <a:satMod val="200000"/>
-              </a:schemeClr>
-            </a:gs>
-          </a:gsLst>
-          <a:path path="circle">
-            <a:fillToRect l="50000" t="50000" r="50000" b="50000"/>
-          </a:path>
-        </a:gradFill>
-      </a:bgFillStyleLst>
-    </a:fmtScheme>
-  </a:themeElements>
-</a:theme>
 </file>
</xml_diff>